<commit_message>
feat: update lession 2
</commit_message>
<xml_diff>
--- a/packages/1_introduce/课程介绍.pptx
+++ b/packages/1_introduce/课程介绍.pptx
@@ -7463,7 +7463,11 @@
           <a:bodyPr/>
           <a:lstStyle/>
           <a:p>
-            <a:endParaRPr lang="zh-CN" altLang="en-US"/>
+            <a:pPr marL="285750" indent="-285750">
+              <a:buFont typeface="Arial" panose="020B0604020202020204" pitchFamily="34" charset="0"/>
+              <a:buChar char="•"/>
+            </a:pPr>
+            <a:endParaRPr lang="zh-CN" altLang="en-US" dirty="0"/>
           </a:p>
         </p:txBody>
       </p:sp>
@@ -7566,8 +7570,8 @@
           <a:lstStyle/>
           <a:p>
             <a:r>
-              <a:rPr lang="zh-CN" altLang="en-US"/>
-              <a:t>课程介绍</a:t>
+              <a:rPr lang="zh-CN" altLang="en-US" dirty="0"/>
+              <a:t>第一节课：课程介绍</a:t>
             </a:r>
           </a:p>
         </p:txBody>

</xml_diff>